<commit_message>
banner image size update
</commit_message>
<xml_diff>
--- a/SEM-UP/images/images.pptx
+++ b/SEM-UP/images/images.pptx
@@ -104,6 +104,11 @@
       </a:defRPr>
     </a:lvl9pPr>
   </p:defaultTextStyle>
+  <p:extLst>
+    <p:ext uri="{EFAFB233-063F-42B5-8137-9DF3F51BA10A}">
+      <p15:sldGuideLst xmlns:p15="http://schemas.microsoft.com/office/powerpoint/2012/main"/>
+    </p:ext>
+  </p:extLst>
 </p:presentation>
 </file>
 
@@ -3015,8 +3020,8 @@
         </p:blipFill>
         <p:spPr>
           <a:xfrm>
-            <a:off x="276323" y="641824"/>
-            <a:ext cx="2322777" cy="2406176"/>
+            <a:off x="186084" y="909642"/>
+            <a:ext cx="1797953" cy="1823947"/>
           </a:xfrm>
           <a:prstGeom prst="rect">
             <a:avLst/>
@@ -3048,8 +3053,8 @@
         </p:blipFill>
         <p:spPr>
           <a:xfrm rot="5400000">
-            <a:off x="6461541" y="955925"/>
-            <a:ext cx="2758377" cy="1904499"/>
+            <a:off x="7025612" y="1183308"/>
+            <a:ext cx="1973563" cy="1481159"/>
           </a:xfrm>
           <a:prstGeom prst="rect">
             <a:avLst/>

</xml_diff>